<commit_message>
unity quest hand tracking
</commit_message>
<xml_diff>
--- a/présentations/presentation_03-03-2021.pptx
+++ b/présentations/presentation_03-03-2021.pptx
@@ -112,6 +112,11 @@
       </a:defRPr>
     </a:lvl9pPr>
   </p:defaultTextStyle>
+  <p:extLst>
+    <p:ext uri="{EFAFB233-063F-42B5-8137-9DF3F51BA10A}">
+      <p15:sldGuideLst xmlns:p15="http://schemas.microsoft.com/office/powerpoint/2012/main"/>
+    </p:ext>
+  </p:extLst>
 </p:presentation>
 </file>
 
@@ -197,7 +202,7 @@
           <a:p>
             <a:fld id="{235B8D6F-7150-4483-BC8E-B7E33386D34E}" type="datetimeFigureOut">
               <a:rPr lang="en-GB" smtClean="0"/>
-              <a:t>02/03/2021</a:t>
+              <a:t>03/03/2021</a:t>
             </a:fld>
             <a:endParaRPr lang="en-GB"/>
           </a:p>
@@ -631,7 +636,7 @@
             </a:r>
             <a:r>
               <a:rPr lang="en-GB" dirty="0" err="1"/>
-              <a:t>independantfly</a:t>
+              <a:t>independantfy</a:t>
             </a:r>
             <a:r>
               <a:rPr lang="en-GB" dirty="0"/>
@@ -928,7 +933,7 @@
             <a:fld id="{B61BEF0D-F0BB-DE4B-95CE-6DB70DBA9567}" type="datetimeFigureOut">
               <a:rPr lang="en-US" dirty="0"/>
               <a:pPr/>
-              <a:t>3/2/2021</a:t>
+              <a:t>3/3/2021</a:t>
             </a:fld>
             <a:endParaRPr lang="en-US" dirty="0"/>
           </a:p>
@@ -1187,7 +1192,7 @@
             <a:fld id="{B61BEF0D-F0BB-DE4B-95CE-6DB70DBA9567}" type="datetimeFigureOut">
               <a:rPr lang="en-US" dirty="0"/>
               <a:pPr/>
-              <a:t>3/2/2021</a:t>
+              <a:t>3/3/2021</a:t>
             </a:fld>
             <a:endParaRPr lang="en-US" dirty="0"/>
           </a:p>
@@ -1419,7 +1424,7 @@
             <a:fld id="{B61BEF0D-F0BB-DE4B-95CE-6DB70DBA9567}" type="datetimeFigureOut">
               <a:rPr lang="en-US" dirty="0"/>
               <a:pPr/>
-              <a:t>3/2/2021</a:t>
+              <a:t>3/3/2021</a:t>
             </a:fld>
             <a:endParaRPr lang="en-US" dirty="0"/>
           </a:p>
@@ -1656,7 +1661,7 @@
             <a:fld id="{B61BEF0D-F0BB-DE4B-95CE-6DB70DBA9567}" type="datetimeFigureOut">
               <a:rPr lang="en-US" dirty="0"/>
               <a:pPr/>
-              <a:t>3/2/2021</a:t>
+              <a:t>3/3/2021</a:t>
             </a:fld>
             <a:endParaRPr lang="en-US" dirty="0"/>
           </a:p>
@@ -1960,7 +1965,7 @@
             <a:fld id="{B61BEF0D-F0BB-DE4B-95CE-6DB70DBA9567}" type="datetimeFigureOut">
               <a:rPr lang="en-US" dirty="0"/>
               <a:pPr/>
-              <a:t>3/2/2021</a:t>
+              <a:t>3/3/2021</a:t>
             </a:fld>
             <a:endParaRPr lang="en-US" dirty="0"/>
           </a:p>
@@ -2259,7 +2264,7 @@
             <a:fld id="{B61BEF0D-F0BB-DE4B-95CE-6DB70DBA9567}" type="datetimeFigureOut">
               <a:rPr lang="en-US" dirty="0"/>
               <a:pPr/>
-              <a:t>3/2/2021</a:t>
+              <a:t>3/3/2021</a:t>
             </a:fld>
             <a:endParaRPr lang="en-US" dirty="0"/>
           </a:p>
@@ -2678,7 +2683,7 @@
             <a:fld id="{B61BEF0D-F0BB-DE4B-95CE-6DB70DBA9567}" type="datetimeFigureOut">
               <a:rPr lang="en-US" dirty="0"/>
               <a:pPr/>
-              <a:t>3/2/2021</a:t>
+              <a:t>3/3/2021</a:t>
             </a:fld>
             <a:endParaRPr lang="en-US" dirty="0"/>
           </a:p>
@@ -2837,7 +2842,7 @@
             <a:fld id="{B61BEF0D-F0BB-DE4B-95CE-6DB70DBA9567}" type="datetimeFigureOut">
               <a:rPr lang="en-US" dirty="0"/>
               <a:pPr/>
-              <a:t>3/2/2021</a:t>
+              <a:t>3/3/2021</a:t>
             </a:fld>
             <a:endParaRPr lang="en-US" dirty="0"/>
           </a:p>
@@ -2929,7 +2934,7 @@
             <a:fld id="{B61BEF0D-F0BB-DE4B-95CE-6DB70DBA9567}" type="datetimeFigureOut">
               <a:rPr lang="en-US" dirty="0"/>
               <a:pPr/>
-              <a:t>3/2/2021</a:t>
+              <a:t>3/3/2021</a:t>
             </a:fld>
             <a:endParaRPr lang="en-US" dirty="0"/>
           </a:p>
@@ -3304,7 +3309,7 @@
             <a:fld id="{B61BEF0D-F0BB-DE4B-95CE-6DB70DBA9567}" type="datetimeFigureOut">
               <a:rPr lang="en-US" dirty="0"/>
               <a:pPr/>
-              <a:t>3/2/2021</a:t>
+              <a:t>3/3/2021</a:t>
             </a:fld>
             <a:endParaRPr lang="en-US" dirty="0"/>
           </a:p>
@@ -3590,7 +3595,7 @@
             <a:fld id="{B61BEF0D-F0BB-DE4B-95CE-6DB70DBA9567}" type="datetimeFigureOut">
               <a:rPr lang="en-US" dirty="0"/>
               <a:pPr/>
-              <a:t>3/2/2021</a:t>
+              <a:t>3/3/2021</a:t>
             </a:fld>
             <a:endParaRPr lang="en-US" dirty="0"/>
           </a:p>
@@ -3798,7 +3803,7 @@
             <a:fld id="{B61BEF0D-F0BB-DE4B-95CE-6DB70DBA9567}" type="datetimeFigureOut">
               <a:rPr lang="en-US" dirty="0"/>
               <a:pPr/>
-              <a:t>3/2/2021</a:t>
+              <a:t>3/3/2021</a:t>
             </a:fld>
             <a:endParaRPr lang="en-US" dirty="0"/>
           </a:p>
@@ -4596,14 +4601,46 @@
               </a:lnSpc>
             </a:pPr>
             <a:r>
-              <a:rPr lang="fr-BE">
+              <a:rPr lang="fr-BE" dirty="0">
                 <a:solidFill>
                   <a:srgbClr val="FFFFFF"/>
                 </a:solidFill>
               </a:rPr>
-              <a:t>Machine learning for emg data</a:t>
-            </a:r>
-            <a:endParaRPr lang="en-GB">
+              <a:t>Machine </a:t>
+            </a:r>
+            <a:r>
+              <a:rPr lang="fr-BE" dirty="0" err="1">
+                <a:solidFill>
+                  <a:srgbClr val="FFFFFF"/>
+                </a:solidFill>
+              </a:rPr>
+              <a:t>learning</a:t>
+            </a:r>
+            <a:r>
+              <a:rPr lang="fr-BE" dirty="0">
+                <a:solidFill>
+                  <a:srgbClr val="FFFFFF"/>
+                </a:solidFill>
+              </a:rPr>
+              <a:t> for </a:t>
+            </a:r>
+            <a:r>
+              <a:rPr lang="fr-BE" dirty="0" err="1">
+                <a:solidFill>
+                  <a:srgbClr val="FFFFFF"/>
+                </a:solidFill>
+              </a:rPr>
+              <a:t>emg</a:t>
+            </a:r>
+            <a:r>
+              <a:rPr lang="fr-BE" dirty="0">
+                <a:solidFill>
+                  <a:srgbClr val="FFFFFF"/>
+                </a:solidFill>
+              </a:rPr>
+              <a:t> data</a:t>
+            </a:r>
+            <a:endParaRPr lang="en-GB" dirty="0">
               <a:solidFill>
                 <a:srgbClr val="FFFFFF"/>
               </a:solidFill>
@@ -5104,14 +5141,14 @@
           <a:lstStyle/>
           <a:p>
             <a:r>
-              <a:rPr lang="fr-BE">
+              <a:rPr lang="fr-BE" dirty="0">
                 <a:solidFill>
                   <a:schemeClr val="accent1"/>
                 </a:solidFill>
               </a:rPr>
               <a:t>Objectifs</a:t>
             </a:r>
-            <a:endParaRPr lang="en-GB">
+            <a:endParaRPr lang="en-GB" dirty="0">
               <a:solidFill>
                 <a:schemeClr val="accent1"/>
               </a:solidFill>
@@ -5798,14 +5835,22 @@
           <a:lstStyle/>
           <a:p>
             <a:r>
-              <a:rPr lang="fr-BE">
+              <a:rPr lang="fr-BE" dirty="0">
                 <a:solidFill>
                   <a:srgbClr val="FFFFFF"/>
                 </a:solidFill>
               </a:rPr>
-              <a:t>Open sim</a:t>
-            </a:r>
-            <a:endParaRPr lang="en-GB">
+              <a:t>Open </a:t>
+            </a:r>
+            <a:r>
+              <a:rPr lang="fr-BE" dirty="0" err="1">
+                <a:solidFill>
+                  <a:srgbClr val="FFFFFF"/>
+                </a:solidFill>
+              </a:rPr>
+              <a:t>sim</a:t>
+            </a:r>
+            <a:endParaRPr lang="en-GB" dirty="0">
               <a:solidFill>
                 <a:srgbClr val="FFFFFF"/>
               </a:solidFill>

</xml_diff>